<commit_message>
Moving Image and Verification session 1
</commit_message>
<xml_diff>
--- a/Sessions/Session_4/Introduction to Verification and SystemVerilog.pptx
+++ b/Sessions/Session_4/Introduction to Verification and SystemVerilog.pptx
@@ -289,7 +289,7 @@
           <a:p>
             <a:fld id="{D93AA480-207C-4FCC-944C-6CBA83AA27BC}" type="datetimeFigureOut">
               <a:rPr lang="en-US" smtClean="0"/>
-              <a:t>4/3/2024</a:t>
+              <a:t>4/4/2024</a:t>
             </a:fld>
             <a:endParaRPr lang="en-US"/>
           </a:p>
@@ -15859,7 +15859,7 @@
           <a:p>
             <a:fld id="{B2C59CCB-E03B-4475-93F6-02C2C349E819}" type="datetime1">
               <a:rPr lang="en-US" smtClean="0"/>
-              <a:t>4/3/2024</a:t>
+              <a:t>4/4/2024</a:t>
             </a:fld>
             <a:endParaRPr lang="en-US"/>
           </a:p>
@@ -16052,7 +16052,7 @@
           <a:p>
             <a:fld id="{5FB9C22E-D1B6-4688-BC60-F48DD78A6A94}" type="datetime1">
               <a:rPr lang="en-US" smtClean="0"/>
-              <a:t>4/3/2024</a:t>
+              <a:t>4/4/2024</a:t>
             </a:fld>
             <a:endParaRPr lang="en-US"/>
           </a:p>
@@ -16226,7 +16226,7 @@
           <a:p>
             <a:fld id="{805A473C-603C-4833-95D1-DB280CEBA2E6}" type="datetime1">
               <a:rPr lang="en-US" smtClean="0"/>
-              <a:t>4/3/2024</a:t>
+              <a:t>4/4/2024</a:t>
             </a:fld>
             <a:endParaRPr lang="en-US"/>
           </a:p>
@@ -16389,7 +16389,7 @@
           <a:p>
             <a:fld id="{482962AD-0C04-426B-A13F-1BF7E825F011}" type="datetime1">
               <a:rPr lang="en-US" smtClean="0"/>
-              <a:t>4/3/2024</a:t>
+              <a:t>4/4/2024</a:t>
             </a:fld>
             <a:endParaRPr lang="en-US"/>
           </a:p>
@@ -16660,7 +16660,7 @@
           <a:p>
             <a:fld id="{E0264AD2-7CDB-4259-812E-A9427043A7DB}" type="datetime1">
               <a:rPr lang="en-US" smtClean="0"/>
-              <a:t>4/3/2024</a:t>
+              <a:t>4/4/2024</a:t>
             </a:fld>
             <a:endParaRPr lang="en-US"/>
           </a:p>
@@ -16942,7 +16942,7 @@
           <a:p>
             <a:fld id="{9D07169F-BCEC-4DE9-B34E-29CAF84C5D5B}" type="datetime1">
               <a:rPr lang="en-US" smtClean="0"/>
-              <a:t>4/3/2024</a:t>
+              <a:t>4/4/2024</a:t>
             </a:fld>
             <a:endParaRPr lang="en-US"/>
           </a:p>
@@ -17369,7 +17369,7 @@
           <a:p>
             <a:fld id="{F211CBBE-CED2-450F-9981-F454E74C21A5}" type="datetime1">
               <a:rPr lang="en-US" smtClean="0"/>
-              <a:t>4/3/2024</a:t>
+              <a:t>4/4/2024</a:t>
             </a:fld>
             <a:endParaRPr lang="en-US"/>
           </a:p>
@@ -17481,7 +17481,7 @@
           <a:p>
             <a:fld id="{276AB240-B96C-4CBA-9313-117DF6492AD2}" type="datetime1">
               <a:rPr lang="en-US" smtClean="0"/>
-              <a:t>4/3/2024</a:t>
+              <a:t>4/4/2024</a:t>
             </a:fld>
             <a:endParaRPr lang="en-US"/>
           </a:p>
@@ -17571,7 +17571,7 @@
           <a:p>
             <a:fld id="{197E5B31-8A31-4EA6-96EA-D80032700A75}" type="datetime1">
               <a:rPr lang="en-US" smtClean="0"/>
-              <a:t>4/3/2024</a:t>
+              <a:t>4/4/2024</a:t>
             </a:fld>
             <a:endParaRPr lang="en-US"/>
           </a:p>
@@ -17760,7 +17760,7 @@
           <a:p>
             <a:fld id="{2C44274D-ED9D-4AFE-ABBA-C4B776AAD012}" type="datetime1">
               <a:rPr lang="en-US" smtClean="0"/>
-              <a:t>4/3/2024</a:t>
+              <a:t>4/4/2024</a:t>
             </a:fld>
             <a:endParaRPr lang="en-US"/>
           </a:p>
@@ -18077,7 +18077,7 @@
           <a:p>
             <a:fld id="{D81AC312-9544-4CCA-964A-0FB86AB5B473}" type="datetime1">
               <a:rPr lang="en-US" smtClean="0"/>
-              <a:t>4/3/2024</a:t>
+              <a:t>4/4/2024</a:t>
             </a:fld>
             <a:endParaRPr lang="en-US"/>
           </a:p>
@@ -18456,7 +18456,7 @@
           <a:p>
             <a:fld id="{62226593-C6EA-4746-8D7F-B2383C85274D}" type="datetime1">
               <a:rPr lang="en-US" smtClean="0"/>
-              <a:t>4/3/2024</a:t>
+              <a:t>4/4/2024</a:t>
             </a:fld>
             <a:endParaRPr lang="en-US"/>
           </a:p>
@@ -21434,7 +21434,9 @@
         </p:nvSpPr>
         <p:spPr/>
         <p:txBody>
-          <a:bodyPr/>
+          <a:bodyPr>
+            <a:normAutofit lnSpcReduction="10000"/>
+          </a:bodyPr>
           <a:lstStyle/>
           <a:p>
             <a:r>
@@ -21470,6 +21472,28 @@
             </a:r>
           </a:p>
           <a:p>
+            <a:endParaRPr lang="en-US" sz="2800" dirty="0" smtClean="0"/>
+          </a:p>
+          <a:p>
+            <a:endParaRPr lang="en-US" sz="2800" dirty="0"/>
+          </a:p>
+          <a:p>
+            <a:endParaRPr lang="en-US" sz="2800" dirty="0" smtClean="0"/>
+          </a:p>
+          <a:p>
+            <a:endParaRPr lang="en-US" sz="2800" dirty="0"/>
+          </a:p>
+          <a:p>
+            <a:endParaRPr lang="en-US" sz="2800" dirty="0" smtClean="0"/>
+          </a:p>
+          <a:p>
+            <a:endParaRPr lang="en-US" sz="2800" dirty="0" smtClean="0"/>
+          </a:p>
+          <a:p>
+            <a:r>
+              <a:rPr lang="en-US" sz="2800" dirty="0" smtClean="0"/>
+              <a:t>Red and green = 0 “Error”</a:t>
+            </a:r>
             <a:endParaRPr lang="en-US" sz="2800" dirty="0"/>
           </a:p>
         </p:txBody>
@@ -25361,6 +25385,13 @@
   <p:clrMapOvr>
     <a:masterClrMapping/>
   </p:clrMapOvr>
+  <p:timing>
+    <p:tnLst>
+      <p:par>
+        <p:cTn id="1" dur="indefinite" restart="never" nodeType="tmRoot"/>
+      </p:par>
+    </p:tnLst>
+  </p:timing>
 </p:sld>
 </file>
 
@@ -26569,6 +26600,13 @@
   <p:clrMapOvr>
     <a:masterClrMapping/>
   </p:clrMapOvr>
+  <p:timing>
+    <p:tnLst>
+      <p:par>
+        <p:cTn id="1" dur="indefinite" restart="never" nodeType="tmRoot"/>
+      </p:par>
+    </p:tnLst>
+  </p:timing>
 </p:sld>
 </file>
 
@@ -28231,6 +28269,13 @@
   <p:clrMapOvr>
     <a:masterClrMapping/>
   </p:clrMapOvr>
+  <p:timing>
+    <p:tnLst>
+      <p:par>
+        <p:cTn id="1" dur="indefinite" restart="never" nodeType="tmRoot"/>
+      </p:par>
+    </p:tnLst>
+  </p:timing>
 </p:sld>
 </file>
 
@@ -28527,6 +28572,13 @@
   <p:clrMapOvr>
     <a:masterClrMapping/>
   </p:clrMapOvr>
+  <p:timing>
+    <p:tnLst>
+      <p:par>
+        <p:cTn id="1" dur="indefinite" restart="never" nodeType="tmRoot"/>
+      </p:par>
+    </p:tnLst>
+  </p:timing>
 </p:sld>
 </file>
 
@@ -28752,6 +28804,13 @@
   <p:clrMapOvr>
     <a:masterClrMapping/>
   </p:clrMapOvr>
+  <p:timing>
+    <p:tnLst>
+      <p:par>
+        <p:cTn id="1" dur="indefinite" restart="never" nodeType="tmRoot"/>
+      </p:par>
+    </p:tnLst>
+  </p:timing>
 </p:sld>
 </file>
 
@@ -30243,6 +30302,13 @@
   <p:clrMapOvr>
     <a:masterClrMapping/>
   </p:clrMapOvr>
+  <p:timing>
+    <p:tnLst>
+      <p:par>
+        <p:cTn id="1" dur="indefinite" restart="never" nodeType="tmRoot"/>
+      </p:par>
+    </p:tnLst>
+  </p:timing>
 </p:sld>
 </file>
 
@@ -30310,8 +30376,13 @@
             </a:r>
             <a:r>
               <a:rPr lang="en-GB" sz="2000" dirty="0"/>
-              <a:t>statements executes in series order. Blocking assignment blocks the execution of next statement until the completion of current assignment execution.</a:t>
-            </a:r>
+              <a:t>statements executes in series order. Blocking assignment blocks the execution of next statement until the completion of current assignment execution</a:t>
+            </a:r>
+            <a:r>
+              <a:rPr lang="en-GB" sz="2000" dirty="0" smtClean="0"/>
+              <a:t>. Used in always block</a:t>
+            </a:r>
+            <a:endParaRPr lang="en-GB" sz="2000" dirty="0"/>
           </a:p>
           <a:p>
             <a:pPr algn="just"/>
@@ -30727,6 +30798,13 @@
   <p:clrMapOvr>
     <a:masterClrMapping/>
   </p:clrMapOvr>
+  <p:timing>
+    <p:tnLst>
+      <p:par>
+        <p:cTn id="1" dur="indefinite" restart="never" nodeType="tmRoot"/>
+      </p:par>
+    </p:tnLst>
+  </p:timing>
 </p:sld>
 </file>
 
@@ -30906,6 +30984,13 @@
   <p:clrMapOvr>
     <a:masterClrMapping/>
   </p:clrMapOvr>
+  <p:timing>
+    <p:tnLst>
+      <p:par>
+        <p:cTn id="1" dur="indefinite" restart="never" nodeType="tmRoot"/>
+      </p:par>
+    </p:tnLst>
+  </p:timing>
 </p:sld>
 </file>
 
@@ -31321,8 +31406,8 @@
         </p:blipFill>
         <p:spPr bwMode="auto">
           <a:xfrm>
-            <a:off x="1647825" y="2130425"/>
-            <a:ext cx="5238750" cy="3740150"/>
+            <a:off x="1319212" y="1417638"/>
+            <a:ext cx="5895975" cy="4209369"/>
           </a:xfrm>
           <a:prstGeom prst="rect">
             <a:avLst/>
@@ -31385,6 +31470,48 @@
           </a:p>
         </p:txBody>
       </p:sp>
+      <p:sp>
+        <p:nvSpPr>
+          <p:cNvPr id="5" name="TextBox 4"/>
+          <p:cNvSpPr txBox="1"/>
+          <p:nvPr/>
+        </p:nvSpPr>
+        <p:spPr>
+          <a:xfrm>
+            <a:off x="457200" y="5840641"/>
+            <a:ext cx="7620000" cy="923330"/>
+          </a:xfrm>
+          <a:prstGeom prst="rect">
+            <a:avLst/>
+          </a:prstGeom>
+          <a:noFill/>
+        </p:spPr>
+        <p:txBody>
+          <a:bodyPr wrap="square" rtlCol="0">
+            <a:spAutoFit/>
+          </a:bodyPr>
+          <a:lstStyle/>
+          <a:p>
+            <a:r>
+              <a:rPr lang="en-GB" dirty="0" smtClean="0"/>
+              <a:t>Initial block “executed at the beginning of simulation time”: X = 0 , Y = 0</a:t>
+            </a:r>
+          </a:p>
+          <a:p>
+            <a:r>
+              <a:rPr lang="en-GB" dirty="0" smtClean="0"/>
+              <a:t>Final block “Executed at the end of the simulation time”: X = 25 , Y = 25</a:t>
+            </a:r>
+          </a:p>
+          <a:p>
+            <a:r>
+              <a:rPr lang="en-GB" dirty="0" smtClean="0"/>
+              <a:t>Non-blocking assignment executed in parallel at the end of the simulation time</a:t>
+            </a:r>
+            <a:endParaRPr lang="en-GB" dirty="0"/>
+          </a:p>
+        </p:txBody>
+      </p:sp>
     </p:spTree>
     <p:extLst>
       <p:ext uri="{BB962C8B-B14F-4D97-AF65-F5344CB8AC3E}">
@@ -31395,6 +31522,13 @@
   <p:clrMapOvr>
     <a:masterClrMapping/>
   </p:clrMapOvr>
+  <p:timing>
+    <p:tnLst>
+      <p:par>
+        <p:cTn id="1" dur="indefinite" restart="never" nodeType="tmRoot"/>
+      </p:par>
+    </p:tnLst>
+  </p:timing>
 </p:sld>
 </file>
 
@@ -31522,6 +31656,13 @@
   <p:clrMapOvr>
     <a:masterClrMapping/>
   </p:clrMapOvr>
+  <p:timing>
+    <p:tnLst>
+      <p:par>
+        <p:cTn id="1" dur="indefinite" restart="never" nodeType="tmRoot"/>
+      </p:par>
+    </p:tnLst>
+  </p:timing>
 </p:sld>
 </file>
 
@@ -31886,13 +32027,56 @@
         </p:nvSpPr>
         <p:spPr/>
         <p:txBody>
-          <a:bodyPr/>
+          <a:bodyPr>
+            <a:normAutofit lnSpcReduction="10000"/>
+          </a:bodyPr>
           <a:lstStyle/>
           <a:p>
             <a:r>
               <a:rPr lang="en-US" dirty="0"/>
-              <a:t>Unique If – Example 2:</a:t>
-            </a:r>
+              <a:t>Unique If – Example 2</a:t>
+            </a:r>
+            <a:r>
+              <a:rPr lang="en-US" dirty="0" smtClean="0"/>
+              <a:t>:</a:t>
+            </a:r>
+          </a:p>
+          <a:p>
+            <a:endParaRPr lang="en-US" dirty="0"/>
+          </a:p>
+          <a:p>
+            <a:endParaRPr lang="en-US" dirty="0" smtClean="0"/>
+          </a:p>
+          <a:p>
+            <a:endParaRPr lang="en-US" dirty="0"/>
+          </a:p>
+          <a:p>
+            <a:endParaRPr lang="en-US" dirty="0" smtClean="0"/>
+          </a:p>
+          <a:p>
+            <a:endParaRPr lang="en-US" dirty="0"/>
+          </a:p>
+          <a:p>
+            <a:endParaRPr lang="en-US" dirty="0" smtClean="0"/>
+          </a:p>
+          <a:p>
+            <a:endParaRPr lang="en-US" dirty="0"/>
+          </a:p>
+          <a:p>
+            <a:endParaRPr lang="en-US" dirty="0" smtClean="0"/>
+          </a:p>
+          <a:p>
+            <a:endParaRPr lang="en-US" dirty="0"/>
+          </a:p>
+          <a:p>
+            <a:endParaRPr lang="en-US" dirty="0" smtClean="0"/>
+          </a:p>
+          <a:p>
+            <a:r>
+              <a:rPr lang="en-US" dirty="0" smtClean="0"/>
+              <a:t>2 warnings no else and no matching condition</a:t>
+            </a:r>
+            <a:endParaRPr lang="en-US" dirty="0"/>
           </a:p>
           <a:p>
             <a:endParaRPr lang="en-US" dirty="0"/>
@@ -31992,7 +32176,7 @@
         </p:nvSpPr>
         <p:spPr>
           <a:xfrm>
-            <a:off x="1447800" y="5410200"/>
+            <a:off x="1968321" y="4851974"/>
             <a:ext cx="6096000" cy="609600"/>
           </a:xfrm>
           <a:prstGeom prst="rect">
@@ -32389,6 +32573,13 @@
   <p:clrMapOvr>
     <a:masterClrMapping/>
   </p:clrMapOvr>
+  <p:timing>
+    <p:tnLst>
+      <p:par>
+        <p:cTn id="1" dur="indefinite" restart="never" nodeType="tmRoot"/>
+      </p:par>
+    </p:tnLst>
+  </p:timing>
 </p:sld>
 </file>
 
@@ -32511,6 +32702,13 @@
   <p:clrMapOvr>
     <a:masterClrMapping/>
   </p:clrMapOvr>
+  <p:timing>
+    <p:tnLst>
+      <p:par>
+        <p:cTn id="1" dur="indefinite" restart="never" nodeType="tmRoot"/>
+      </p:par>
+    </p:tnLst>
+  </p:timing>
 </p:sld>
 </file>
 
@@ -32870,8 +33068,8 @@
         </p:blipFill>
         <p:spPr bwMode="auto">
           <a:xfrm>
-            <a:off x="1447800" y="1828800"/>
-            <a:ext cx="5238750" cy="1911350"/>
+            <a:off x="1181100" y="2057400"/>
+            <a:ext cx="6172200" cy="2895600"/>
           </a:xfrm>
           <a:prstGeom prst="rect">
             <a:avLst/>
@@ -32934,6 +33132,51 @@
           </a:p>
         </p:txBody>
       </p:sp>
+      <p:sp>
+        <p:nvSpPr>
+          <p:cNvPr id="3" name="TextBox 2"/>
+          <p:cNvSpPr txBox="1"/>
+          <p:nvPr/>
+        </p:nvSpPr>
+        <p:spPr>
+          <a:xfrm>
+            <a:off x="990600" y="5334000"/>
+            <a:ext cx="6553200" cy="1200329"/>
+          </a:xfrm>
+          <a:prstGeom prst="rect">
+            <a:avLst/>
+          </a:prstGeom>
+          <a:noFill/>
+        </p:spPr>
+        <p:txBody>
+          <a:bodyPr wrap="square" rtlCol="0">
+            <a:spAutoFit/>
+          </a:bodyPr>
+          <a:lstStyle/>
+          <a:p>
+            <a:r>
+              <a:rPr lang="en-GB" dirty="0" smtClean="0"/>
+              <a:t>2 warnings:</a:t>
+            </a:r>
+          </a:p>
+          <a:p>
+            <a:endParaRPr lang="en-GB" dirty="0" smtClean="0"/>
+          </a:p>
+          <a:p>
+            <a:r>
+              <a:rPr lang="en-GB" dirty="0" smtClean="0"/>
+              <a:t>1) no else statement </a:t>
+            </a:r>
+          </a:p>
+          <a:p>
+            <a:r>
+              <a:rPr lang="en-GB" dirty="0" smtClean="0"/>
+              <a:t>2) No condition matched </a:t>
+            </a:r>
+            <a:endParaRPr lang="en-GB" dirty="0"/>
+          </a:p>
+        </p:txBody>
+      </p:sp>
     </p:spTree>
     <p:extLst>
       <p:ext uri="{BB962C8B-B14F-4D97-AF65-F5344CB8AC3E}">
@@ -32944,6 +33187,13 @@
   <p:clrMapOvr>
     <a:masterClrMapping/>
   </p:clrMapOvr>
+  <p:timing>
+    <p:tnLst>
+      <p:par>
+        <p:cTn id="1" dur="indefinite" restart="never" nodeType="tmRoot"/>
+      </p:par>
+    </p:tnLst>
+  </p:timing>
 </p:sld>
 </file>
 
@@ -33434,6 +33684,13 @@
   <p:clrMapOvr>
     <a:masterClrMapping/>
   </p:clrMapOvr>
+  <p:timing>
+    <p:tnLst>
+      <p:par>
+        <p:cTn id="1" dur="indefinite" restart="never" nodeType="tmRoot"/>
+      </p:par>
+    </p:tnLst>
+  </p:timing>
 </p:sld>
 </file>
 
@@ -36052,6 +36309,48 @@
           </a:p>
         </p:txBody>
       </p:sp>
+      <p:sp>
+        <p:nvSpPr>
+          <p:cNvPr id="3" name="TextBox 2"/>
+          <p:cNvSpPr txBox="1"/>
+          <p:nvPr/>
+        </p:nvSpPr>
+        <p:spPr>
+          <a:xfrm>
+            <a:off x="990600" y="5105400"/>
+            <a:ext cx="5486400" cy="923330"/>
+          </a:xfrm>
+          <a:prstGeom prst="rect">
+            <a:avLst/>
+          </a:prstGeom>
+          <a:noFill/>
+        </p:spPr>
+        <p:txBody>
+          <a:bodyPr wrap="square" rtlCol="0">
+            <a:spAutoFit/>
+          </a:bodyPr>
+          <a:lstStyle/>
+          <a:p>
+            <a:r>
+              <a:rPr lang="en-GB" dirty="0" smtClean="0"/>
+              <a:t>4 </a:t>
+            </a:r>
+          </a:p>
+          <a:p>
+            <a:r>
+              <a:rPr lang="en-GB" dirty="0" smtClean="0"/>
+              <a:t>8</a:t>
+            </a:r>
+          </a:p>
+          <a:p>
+            <a:r>
+              <a:rPr lang="en-GB" dirty="0" smtClean="0"/>
+              <a:t>12</a:t>
+            </a:r>
+            <a:endParaRPr lang="en-GB" dirty="0"/>
+          </a:p>
+        </p:txBody>
+      </p:sp>
     </p:spTree>
     <p:extLst>
       <p:ext uri="{BB962C8B-B14F-4D97-AF65-F5344CB8AC3E}">
@@ -36062,6 +36361,13 @@
   <p:clrMapOvr>
     <a:masterClrMapping/>
   </p:clrMapOvr>
+  <p:timing>
+    <p:tnLst>
+      <p:par>
+        <p:cTn id="1" dur="indefinite" restart="never" nodeType="tmRoot"/>
+      </p:par>
+    </p:tnLst>
+  </p:timing>
 </p:sld>
 </file>
 
@@ -36195,6 +36501,13 @@
   <p:clrMapOvr>
     <a:masterClrMapping/>
   </p:clrMapOvr>
+  <p:timing>
+    <p:tnLst>
+      <p:par>
+        <p:cTn id="1" dur="indefinite" restart="never" nodeType="tmRoot"/>
+      </p:par>
+    </p:tnLst>
+  </p:timing>
 </p:sld>
 </file>
 
@@ -36672,6 +36985,13 @@
   <p:clrMapOvr>
     <a:masterClrMapping/>
   </p:clrMapOvr>
+  <p:timing>
+    <p:tnLst>
+      <p:par>
+        <p:cTn id="1" dur="indefinite" restart="never" nodeType="tmRoot"/>
+      </p:par>
+    </p:tnLst>
+  </p:timing>
 </p:sld>
 </file>
 
@@ -37147,6 +37467,13 @@
   <p:clrMapOvr>
     <a:masterClrMapping/>
   </p:clrMapOvr>
+  <p:timing>
+    <p:tnLst>
+      <p:par>
+        <p:cTn id="1" dur="indefinite" restart="never" nodeType="tmRoot"/>
+      </p:par>
+    </p:tnLst>
+  </p:timing>
 </p:sld>
 </file>
 
@@ -37346,6 +37673,10 @@
             <a:r>
               <a:rPr lang="en-GB" dirty="0" err="1"/>
               <a:t>Join_none</a:t>
+            </a:r>
+            <a:r>
+              <a:rPr lang="en-GB" dirty="0"/>
+              <a:t/>
             </a:r>
             <a:br>
               <a:rPr lang="en-GB" dirty="0"/>
@@ -38138,6 +38469,36 @@
           </a:p>
         </p:txBody>
       </p:sp>
+      <p:sp>
+        <p:nvSpPr>
+          <p:cNvPr id="5" name="TextBox 4"/>
+          <p:cNvSpPr txBox="1"/>
+          <p:nvPr/>
+        </p:nvSpPr>
+        <p:spPr>
+          <a:xfrm>
+            <a:off x="2992412" y="6488668"/>
+            <a:ext cx="2514600" cy="369332"/>
+          </a:xfrm>
+          <a:prstGeom prst="rect">
+            <a:avLst/>
+          </a:prstGeom>
+          <a:noFill/>
+        </p:spPr>
+        <p:txBody>
+          <a:bodyPr wrap="square" rtlCol="0">
+            <a:spAutoFit/>
+          </a:bodyPr>
+          <a:lstStyle/>
+          <a:p>
+            <a:r>
+              <a:rPr lang="en-GB" dirty="0" smtClean="0"/>
+              <a:t>As fork join</a:t>
+            </a:r>
+            <a:endParaRPr lang="en-GB" dirty="0"/>
+          </a:p>
+        </p:txBody>
+      </p:sp>
     </p:spTree>
     <p:extLst>
       <p:ext uri="{BB962C8B-B14F-4D97-AF65-F5344CB8AC3E}">
@@ -38774,6 +39135,36 @@
           </a:p>
         </p:txBody>
       </p:sp>
+      <p:sp>
+        <p:nvSpPr>
+          <p:cNvPr id="5" name="TextBox 4"/>
+          <p:cNvSpPr txBox="1"/>
+          <p:nvPr/>
+        </p:nvSpPr>
+        <p:spPr>
+          <a:xfrm>
+            <a:off x="1219200" y="6045200"/>
+            <a:ext cx="4724400" cy="369332"/>
+          </a:xfrm>
+          <a:prstGeom prst="rect">
+            <a:avLst/>
+          </a:prstGeom>
+          <a:noFill/>
+        </p:spPr>
+        <p:txBody>
+          <a:bodyPr wrap="square" rtlCol="0">
+            <a:spAutoFit/>
+          </a:bodyPr>
+          <a:lstStyle/>
+          <a:p>
+            <a:r>
+              <a:rPr lang="en-GB" dirty="0" smtClean="0"/>
+              <a:t>Pass x by reference </a:t>
+            </a:r>
+            <a:endParaRPr lang="en-GB" dirty="0"/>
+          </a:p>
+        </p:txBody>
+      </p:sp>
     </p:spTree>
     <p:extLst>
       <p:ext uri="{BB962C8B-B14F-4D97-AF65-F5344CB8AC3E}">
@@ -39256,6 +39647,13 @@
   <p:clrMapOvr>
     <a:masterClrMapping/>
   </p:clrMapOvr>
+  <p:timing>
+    <p:tnLst>
+      <p:par>
+        <p:cTn id="1" dur="indefinite" restart="never" nodeType="tmRoot"/>
+      </p:par>
+    </p:tnLst>
+  </p:timing>
 </p:sld>
 </file>
 
@@ -39918,6 +40316,13 @@
   <p:clrMapOvr>
     <a:masterClrMapping/>
   </p:clrMapOvr>
+  <p:timing>
+    <p:tnLst>
+      <p:par>
+        <p:cTn id="1" dur="indefinite" restart="never" nodeType="tmRoot"/>
+      </p:par>
+    </p:tnLst>
+  </p:timing>
 </p:sld>
 </file>
 
@@ -40118,6 +40523,36 @@
           </a:extLst>
         </p:spPr>
       </p:pic>
+      <p:sp>
+        <p:nvSpPr>
+          <p:cNvPr id="6" name="TextBox 5"/>
+          <p:cNvSpPr txBox="1"/>
+          <p:nvPr/>
+        </p:nvSpPr>
+        <p:spPr>
+          <a:xfrm>
+            <a:off x="6172200" y="1722218"/>
+            <a:ext cx="1295400" cy="369332"/>
+          </a:xfrm>
+          <a:prstGeom prst="rect">
+            <a:avLst/>
+          </a:prstGeom>
+          <a:noFill/>
+        </p:spPr>
+        <p:txBody>
+          <a:bodyPr wrap="square" rtlCol="0">
+            <a:spAutoFit/>
+          </a:bodyPr>
+          <a:lstStyle/>
+          <a:p>
+            <a:r>
+              <a:rPr lang="en-GB" dirty="0" smtClean="0"/>
+              <a:t>At the top </a:t>
+            </a:r>
+            <a:endParaRPr lang="en-GB" dirty="0"/>
+          </a:p>
+        </p:txBody>
+      </p:sp>
     </p:spTree>
     <p:extLst>
       <p:ext uri="{BB962C8B-B14F-4D97-AF65-F5344CB8AC3E}">
@@ -40128,6 +40563,13 @@
   <p:clrMapOvr>
     <a:masterClrMapping/>
   </p:clrMapOvr>
+  <p:timing>
+    <p:tnLst>
+      <p:par>
+        <p:cTn id="1" dur="indefinite" restart="never" nodeType="tmRoot"/>
+      </p:par>
+    </p:tnLst>
+  </p:timing>
 </p:sld>
 </file>
 
@@ -40450,6 +40892,13 @@
   <p:clrMapOvr>
     <a:masterClrMapping/>
   </p:clrMapOvr>
+  <p:timing>
+    <p:tnLst>
+      <p:par>
+        <p:cTn id="1" dur="indefinite" restart="never" nodeType="tmRoot"/>
+      </p:par>
+    </p:tnLst>
+  </p:timing>
 </p:sld>
 </file>
 
@@ -40548,6 +40997,13 @@
   <p:clrMapOvr>
     <a:masterClrMapping/>
   </p:clrMapOvr>
+  <p:timing>
+    <p:tnLst>
+      <p:par>
+        <p:cTn id="1" dur="indefinite" restart="never" nodeType="tmRoot"/>
+      </p:par>
+    </p:tnLst>
+  </p:timing>
 </p:sld>
 </file>
 
@@ -40657,6 +41113,13 @@
   <p:clrMapOvr>
     <a:masterClrMapping/>
   </p:clrMapOvr>
+  <p:timing>
+    <p:tnLst>
+      <p:par>
+        <p:cTn id="1" dur="indefinite" restart="never" nodeType="tmRoot"/>
+      </p:par>
+    </p:tnLst>
+  </p:timing>
 </p:sld>
 </file>
 

</xml_diff>